<commit_message>
Slide and Demo Updates
Update to jQuery demo, added custom media type demo, updated slides to
synchronize
</commit_message>
<xml_diff>
--- a/Slides/Module 2 - Web API Basic Design.pptx
+++ b/Slides/Module 2 - Web API Basic Design.pptx
@@ -11892,7 +11892,7 @@
           <a:p>
             <a:fld id="{312E7B4A-039C-48A2-9B2C-AF16AA3873D8}" type="datetimeFigureOut">
               <a:rPr lang="en-US" smtClean="0"/>
-              <a:t>12/21/2014</a:t>
+              <a:t>1/3/2015</a:t>
             </a:fld>
             <a:endParaRPr lang="en-US"/>
           </a:p>
@@ -12057,7 +12057,7 @@
           <a:p>
             <a:fld id="{DA005A0C-54D9-45AA-87D4-C551D08DFCE1}" type="datetimeFigureOut">
               <a:rPr lang="en-US" smtClean="0"/>
-              <a:t>12/21/2014</a:t>
+              <a:t>1/3/2015</a:t>
             </a:fld>
             <a:endParaRPr lang="en-US"/>
           </a:p>
@@ -12845,7 +12845,7 @@
           <a:p>
             <a:r>
               <a:rPr lang="en-US" smtClean="0"/>
-              <a:t>http://jsfiddle.net/jeremylikness/e0weyq70/</a:t>
+              <a:t>02aContentNegotiation – 02bjQuery.html</a:t>
             </a:r>
             <a:endParaRPr lang="en-US" dirty="0"/>
           </a:p>
@@ -19096,6 +19096,28 @@
 </file>
 
 <file path=customXml/item1.xml><?xml version="1.0" encoding="utf-8"?>
+<?mso-contentType ?>
+<FormTemplates xmlns="http://schemas.microsoft.com/sharepoint/v3/contenttype/forms">
+  <Display>DocumentLibraryForm</Display>
+  <Edit>DocumentLibraryForm</Edit>
+  <New>DocumentLibraryForm</New>
+</FormTemplates>
+</file>
+
+<file path=customXml/item2.xml><?xml version="1.0" encoding="utf-8"?>
+<p:properties xmlns:p="http://schemas.microsoft.com/office/2006/metadata/properties" xmlns:xsi="http://www.w3.org/2001/XMLSchema-instance" xmlns:pc="http://schemas.microsoft.com/office/infopath/2007/PartnerControls">
+  <documentManagement>
+    <TaxCatchAll xmlns="230e9df3-be65-4c73-a93b-d1236ebd677e"/>
+    <PublishingExpirationDate xmlns="http://schemas.microsoft.com/sharepoint/v3" xsi:nil="true"/>
+    <PublishingStartDate xmlns="http://schemas.microsoft.com/sharepoint/v3" xsi:nil="true"/>
+    <TaxKeywordTaxHTField xmlns="230e9df3-be65-4c73-a93b-d1236ebd677e">
+      <Terms xmlns="http://schemas.microsoft.com/office/infopath/2007/PartnerControls"/>
+    </TaxKeywordTaxHTField>
+  </documentManagement>
+</p:properties>
+</file>
+
+<file path=customXml/item3.xml><?xml version="1.0" encoding="utf-8"?>
 <ct:contentTypeSchema xmlns:ct="http://schemas.microsoft.com/office/2006/metadata/contentType" xmlns:ma="http://schemas.microsoft.com/office/2006/metadata/properties/metaAttributes" ct:_="" ma:_="" ma:contentTypeName="Document" ma:contentTypeID="0x010100496889825850D44592AC5D2F43187AE4" ma:contentTypeVersion="5" ma:contentTypeDescription="Create a new document." ma:contentTypeScope="" ma:versionID="fde90edb5a63ba841bca516fd2abaf95">
   <xsd:schema xmlns:xsd="http://www.w3.org/2001/XMLSchema" xmlns:xs="http://www.w3.org/2001/XMLSchema" xmlns:p="http://schemas.microsoft.com/office/2006/metadata/properties" xmlns:ns1="http://schemas.microsoft.com/sharepoint/v3" xmlns:ns2="230e9df3-be65-4c73-a93b-d1236ebd677e" xmlns:ns3="27aa9422-7f1f-4c84-9cdf-302b1a67e513" targetNamespace="http://schemas.microsoft.com/office/2006/metadata/properties" ma:root="true" ma:fieldsID="5e7808ae941cc340dbe51a3031959734" ns1:_="" ns2:_="" ns3:_="">
     <xsd:import namespace="http://schemas.microsoft.com/sharepoint/v3"/>
@@ -19277,44 +19299,10 @@
 </ct:contentTypeSchema>
 </file>
 
-<file path=customXml/item2.xml><?xml version="1.0" encoding="utf-8"?>
-<p:properties xmlns:p="http://schemas.microsoft.com/office/2006/metadata/properties" xmlns:xsi="http://www.w3.org/2001/XMLSchema-instance" xmlns:pc="http://schemas.microsoft.com/office/infopath/2007/PartnerControls">
-  <documentManagement>
-    <TaxCatchAll xmlns="230e9df3-be65-4c73-a93b-d1236ebd677e"/>
-    <PublishingExpirationDate xmlns="http://schemas.microsoft.com/sharepoint/v3" xsi:nil="true"/>
-    <PublishingStartDate xmlns="http://schemas.microsoft.com/sharepoint/v3" xsi:nil="true"/>
-    <TaxKeywordTaxHTField xmlns="230e9df3-be65-4c73-a93b-d1236ebd677e">
-      <Terms xmlns="http://schemas.microsoft.com/office/infopath/2007/PartnerControls"/>
-    </TaxKeywordTaxHTField>
-  </documentManagement>
-</p:properties>
-</file>
-
-<file path=customXml/item3.xml><?xml version="1.0" encoding="utf-8"?>
-<?mso-contentType ?>
-<FormTemplates xmlns="http://schemas.microsoft.com/sharepoint/v3/contenttype/forms">
-  <Display>DocumentLibraryForm</Display>
-  <Edit>DocumentLibraryForm</Edit>
-  <New>DocumentLibraryForm</New>
-</FormTemplates>
-</file>
-
 <file path=customXml/itemProps1.xml><?xml version="1.0" encoding="utf-8"?>
-<ds:datastoreItem xmlns:ds="http://schemas.openxmlformats.org/officeDocument/2006/customXml" ds:itemID="{3253B29C-1CCD-4FE8-A1C4-023A0910DF96}">
+<ds:datastoreItem xmlns:ds="http://schemas.openxmlformats.org/officeDocument/2006/customXml" ds:itemID="{B0CA13EC-1D3C-4D6F-8D1C-E8A452CFC79A}">
   <ds:schemaRefs>
-    <ds:schemaRef ds:uri="http://schemas.microsoft.com/office/2006/metadata/contentType"/>
-    <ds:schemaRef ds:uri="http://schemas.microsoft.com/office/2006/metadata/properties/metaAttributes"/>
-    <ds:schemaRef ds:uri="http://www.w3.org/2001/XMLSchema"/>
-    <ds:schemaRef ds:uri="http://schemas.microsoft.com/office/2006/metadata/properties"/>
-    <ds:schemaRef ds:uri="http://schemas.microsoft.com/sharepoint/v3"/>
-    <ds:schemaRef ds:uri="230e9df3-be65-4c73-a93b-d1236ebd677e"/>
-    <ds:schemaRef ds:uri="27aa9422-7f1f-4c84-9cdf-302b1a67e513"/>
-    <ds:schemaRef ds:uri="http://schemas.microsoft.com/office/2006/documentManagement/types"/>
-    <ds:schemaRef ds:uri="http://schemas.microsoft.com/office/infopath/2007/PartnerControls"/>
-    <ds:schemaRef ds:uri="http://schemas.openxmlformats.org/package/2006/metadata/core-properties"/>
-    <ds:schemaRef ds:uri="http://purl.org/dc/elements/1.1/"/>
-    <ds:schemaRef ds:uri="http://purl.org/dc/terms/"/>
-    <ds:schemaRef ds:uri="http://schemas.microsoft.com/internal/obd"/>
+    <ds:schemaRef ds:uri="http://schemas.microsoft.com/sharepoint/v3/contenttype/forms"/>
   </ds:schemaRefs>
 </ds:datastoreItem>
 </file>
@@ -19338,9 +19326,21 @@
 </file>
 
 <file path=customXml/itemProps3.xml><?xml version="1.0" encoding="utf-8"?>
-<ds:datastoreItem xmlns:ds="http://schemas.openxmlformats.org/officeDocument/2006/customXml" ds:itemID="{B0CA13EC-1D3C-4D6F-8D1C-E8A452CFC79A}">
+<ds:datastoreItem xmlns:ds="http://schemas.openxmlformats.org/officeDocument/2006/customXml" ds:itemID="{3253B29C-1CCD-4FE8-A1C4-023A0910DF96}">
   <ds:schemaRefs>
-    <ds:schemaRef ds:uri="http://schemas.microsoft.com/sharepoint/v3/contenttype/forms"/>
+    <ds:schemaRef ds:uri="http://schemas.microsoft.com/office/2006/metadata/contentType"/>
+    <ds:schemaRef ds:uri="http://schemas.microsoft.com/office/2006/metadata/properties/metaAttributes"/>
+    <ds:schemaRef ds:uri="http://www.w3.org/2001/XMLSchema"/>
+    <ds:schemaRef ds:uri="http://schemas.microsoft.com/office/2006/metadata/properties"/>
+    <ds:schemaRef ds:uri="http://schemas.microsoft.com/sharepoint/v3"/>
+    <ds:schemaRef ds:uri="230e9df3-be65-4c73-a93b-d1236ebd677e"/>
+    <ds:schemaRef ds:uri="27aa9422-7f1f-4c84-9cdf-302b1a67e513"/>
+    <ds:schemaRef ds:uri="http://schemas.microsoft.com/office/2006/documentManagement/types"/>
+    <ds:schemaRef ds:uri="http://schemas.microsoft.com/office/infopath/2007/PartnerControls"/>
+    <ds:schemaRef ds:uri="http://schemas.openxmlformats.org/package/2006/metadata/core-properties"/>
+    <ds:schemaRef ds:uri="http://purl.org/dc/elements/1.1/"/>
+    <ds:schemaRef ds:uri="http://purl.org/dc/terms/"/>
+    <ds:schemaRef ds:uri="http://schemas.microsoft.com/internal/obd"/>
   </ds:schemaRefs>
 </ds:datastoreItem>
 </file>
</xml_diff>

<commit_message>
Fixes to notes and slide transitions
</commit_message>
<xml_diff>
--- a/Slides/Module 2 - Web API Basic Design.pptx
+++ b/Slides/Module 2 - Web API Basic Design.pptx
@@ -11898,7 +11898,7 @@
           <a:p>
             <a:fld id="{312E7B4A-039C-48A2-9B2C-AF16AA3873D8}" type="datetimeFigureOut">
               <a:rPr lang="en-US" smtClean="0"/>
-              <a:t>1/26/2015</a:t>
+              <a:t>2/2/2015</a:t>
             </a:fld>
             <a:endParaRPr lang="en-US"/>
           </a:p>
@@ -12063,7 +12063,7 @@
           <a:p>
             <a:fld id="{DA005A0C-54D9-45AA-87D4-C551D08DFCE1}" type="datetimeFigureOut">
               <a:rPr lang="en-US" smtClean="0"/>
-              <a:t>1/26/2015</a:t>
+              <a:t>2/2/2015</a:t>
             </a:fld>
             <a:endParaRPr lang="en-US"/>
           </a:p>
@@ -12650,12 +12650,12 @@
               <a:t>Show </a:t>
             </a:r>
             <a:r>
-              <a:rPr lang="en-US" dirty="0" err="1" smtClean="0"/>
-              <a:t>Odata</a:t>
-            </a:r>
-            <a:r>
               <a:rPr lang="en-US" dirty="0" smtClean="0"/>
-              <a:t> example, but add</a:t>
+              <a:t>solution example</a:t>
+            </a:r>
+            <a:r>
+              <a:rPr lang="en-US" dirty="0" smtClean="0"/>
+              <a:t>, but add</a:t>
             </a:r>
             <a:r>
               <a:rPr lang="en-US" baseline="0" dirty="0" smtClean="0"/>
@@ -16551,7 +16551,6 @@
               <a:rPr lang="en-US" dirty="0" smtClean="0"/>
               <a:t>Generates documentation to validate your API routes and parameters</a:t>
             </a:r>
-            <a:endParaRPr lang="en-US" dirty="0" smtClean="0"/>
           </a:p>
           <a:p>
             <a:r>
@@ -16600,7 +16599,6 @@
               <a:rPr lang="en-US" dirty="0" smtClean="0"/>
               <a:t> </a:t>
             </a:r>
-            <a:endParaRPr lang="en-US" dirty="0" smtClean="0"/>
           </a:p>
           <a:p>
             <a:endParaRPr lang="en-US" dirty="0" smtClean="0"/>
@@ -18921,28 +18919,6 @@
 </file>
 
 <file path=customXml/item1.xml><?xml version="1.0" encoding="utf-8"?>
-<?mso-contentType ?>
-<FormTemplates xmlns="http://schemas.microsoft.com/sharepoint/v3/contenttype/forms">
-  <Display>DocumentLibraryForm</Display>
-  <Edit>DocumentLibraryForm</Edit>
-  <New>DocumentLibraryForm</New>
-</FormTemplates>
-</file>
-
-<file path=customXml/item2.xml><?xml version="1.0" encoding="utf-8"?>
-<p:properties xmlns:p="http://schemas.microsoft.com/office/2006/metadata/properties" xmlns:xsi="http://www.w3.org/2001/XMLSchema-instance" xmlns:pc="http://schemas.microsoft.com/office/infopath/2007/PartnerControls">
-  <documentManagement>
-    <TaxCatchAll xmlns="230e9df3-be65-4c73-a93b-d1236ebd677e"/>
-    <PublishingExpirationDate xmlns="http://schemas.microsoft.com/sharepoint/v3" xsi:nil="true"/>
-    <PublishingStartDate xmlns="http://schemas.microsoft.com/sharepoint/v3" xsi:nil="true"/>
-    <TaxKeywordTaxHTField xmlns="230e9df3-be65-4c73-a93b-d1236ebd677e">
-      <Terms xmlns="http://schemas.microsoft.com/office/infopath/2007/PartnerControls"/>
-    </TaxKeywordTaxHTField>
-  </documentManagement>
-</p:properties>
-</file>
-
-<file path=customXml/item3.xml><?xml version="1.0" encoding="utf-8"?>
 <ct:contentTypeSchema xmlns:ct="http://schemas.microsoft.com/office/2006/metadata/contentType" xmlns:ma="http://schemas.microsoft.com/office/2006/metadata/properties/metaAttributes" ct:_="" ma:_="" ma:contentTypeName="Document" ma:contentTypeID="0x010100496889825850D44592AC5D2F43187AE4" ma:contentTypeVersion="5" ma:contentTypeDescription="Create a new document." ma:contentTypeScope="" ma:versionID="fde90edb5a63ba841bca516fd2abaf95">
   <xsd:schema xmlns:xsd="http://www.w3.org/2001/XMLSchema" xmlns:xs="http://www.w3.org/2001/XMLSchema" xmlns:p="http://schemas.microsoft.com/office/2006/metadata/properties" xmlns:ns1="http://schemas.microsoft.com/sharepoint/v3" xmlns:ns2="230e9df3-be65-4c73-a93b-d1236ebd677e" xmlns:ns3="27aa9422-7f1f-4c84-9cdf-302b1a67e513" targetNamespace="http://schemas.microsoft.com/office/2006/metadata/properties" ma:root="true" ma:fieldsID="5e7808ae941cc340dbe51a3031959734" ns1:_="" ns2:_="" ns3:_="">
     <xsd:import namespace="http://schemas.microsoft.com/sharepoint/v3"/>
@@ -19124,10 +19100,44 @@
 </ct:contentTypeSchema>
 </file>
 
+<file path=customXml/item2.xml><?xml version="1.0" encoding="utf-8"?>
+<p:properties xmlns:p="http://schemas.microsoft.com/office/2006/metadata/properties" xmlns:xsi="http://www.w3.org/2001/XMLSchema-instance" xmlns:pc="http://schemas.microsoft.com/office/infopath/2007/PartnerControls">
+  <documentManagement>
+    <TaxCatchAll xmlns="230e9df3-be65-4c73-a93b-d1236ebd677e"/>
+    <PublishingExpirationDate xmlns="http://schemas.microsoft.com/sharepoint/v3" xsi:nil="true"/>
+    <PublishingStartDate xmlns="http://schemas.microsoft.com/sharepoint/v3" xsi:nil="true"/>
+    <TaxKeywordTaxHTField xmlns="230e9df3-be65-4c73-a93b-d1236ebd677e">
+      <Terms xmlns="http://schemas.microsoft.com/office/infopath/2007/PartnerControls"/>
+    </TaxKeywordTaxHTField>
+  </documentManagement>
+</p:properties>
+</file>
+
+<file path=customXml/item3.xml><?xml version="1.0" encoding="utf-8"?>
+<?mso-contentType ?>
+<FormTemplates xmlns="http://schemas.microsoft.com/sharepoint/v3/contenttype/forms">
+  <Display>DocumentLibraryForm</Display>
+  <Edit>DocumentLibraryForm</Edit>
+  <New>DocumentLibraryForm</New>
+</FormTemplates>
+</file>
+
 <file path=customXml/itemProps1.xml><?xml version="1.0" encoding="utf-8"?>
-<ds:datastoreItem xmlns:ds="http://schemas.openxmlformats.org/officeDocument/2006/customXml" ds:itemID="{B0CA13EC-1D3C-4D6F-8D1C-E8A452CFC79A}">
+<ds:datastoreItem xmlns:ds="http://schemas.openxmlformats.org/officeDocument/2006/customXml" ds:itemID="{3253B29C-1CCD-4FE8-A1C4-023A0910DF96}">
   <ds:schemaRefs>
-    <ds:schemaRef ds:uri="http://schemas.microsoft.com/sharepoint/v3/contenttype/forms"/>
+    <ds:schemaRef ds:uri="http://schemas.microsoft.com/office/2006/metadata/contentType"/>
+    <ds:schemaRef ds:uri="http://schemas.microsoft.com/office/2006/metadata/properties/metaAttributes"/>
+    <ds:schemaRef ds:uri="http://www.w3.org/2001/XMLSchema"/>
+    <ds:schemaRef ds:uri="http://schemas.microsoft.com/office/2006/metadata/properties"/>
+    <ds:schemaRef ds:uri="http://schemas.microsoft.com/sharepoint/v3"/>
+    <ds:schemaRef ds:uri="230e9df3-be65-4c73-a93b-d1236ebd677e"/>
+    <ds:schemaRef ds:uri="27aa9422-7f1f-4c84-9cdf-302b1a67e513"/>
+    <ds:schemaRef ds:uri="http://schemas.microsoft.com/office/2006/documentManagement/types"/>
+    <ds:schemaRef ds:uri="http://schemas.microsoft.com/office/infopath/2007/PartnerControls"/>
+    <ds:schemaRef ds:uri="http://schemas.openxmlformats.org/package/2006/metadata/core-properties"/>
+    <ds:schemaRef ds:uri="http://purl.org/dc/elements/1.1/"/>
+    <ds:schemaRef ds:uri="http://purl.org/dc/terms/"/>
+    <ds:schemaRef ds:uri="http://schemas.microsoft.com/internal/obd"/>
   </ds:schemaRefs>
 </ds:datastoreItem>
 </file>
@@ -19151,21 +19161,9 @@
 </file>
 
 <file path=customXml/itemProps3.xml><?xml version="1.0" encoding="utf-8"?>
-<ds:datastoreItem xmlns:ds="http://schemas.openxmlformats.org/officeDocument/2006/customXml" ds:itemID="{3253B29C-1CCD-4FE8-A1C4-023A0910DF96}">
+<ds:datastoreItem xmlns:ds="http://schemas.openxmlformats.org/officeDocument/2006/customXml" ds:itemID="{B0CA13EC-1D3C-4D6F-8D1C-E8A452CFC79A}">
   <ds:schemaRefs>
-    <ds:schemaRef ds:uri="http://schemas.microsoft.com/office/2006/metadata/contentType"/>
-    <ds:schemaRef ds:uri="http://schemas.microsoft.com/office/2006/metadata/properties/metaAttributes"/>
-    <ds:schemaRef ds:uri="http://www.w3.org/2001/XMLSchema"/>
-    <ds:schemaRef ds:uri="http://schemas.microsoft.com/office/2006/metadata/properties"/>
-    <ds:schemaRef ds:uri="http://schemas.microsoft.com/sharepoint/v3"/>
-    <ds:schemaRef ds:uri="230e9df3-be65-4c73-a93b-d1236ebd677e"/>
-    <ds:schemaRef ds:uri="27aa9422-7f1f-4c84-9cdf-302b1a67e513"/>
-    <ds:schemaRef ds:uri="http://schemas.microsoft.com/office/2006/documentManagement/types"/>
-    <ds:schemaRef ds:uri="http://schemas.microsoft.com/office/infopath/2007/PartnerControls"/>
-    <ds:schemaRef ds:uri="http://schemas.openxmlformats.org/package/2006/metadata/core-properties"/>
-    <ds:schemaRef ds:uri="http://purl.org/dc/elements/1.1/"/>
-    <ds:schemaRef ds:uri="http://purl.org/dc/terms/"/>
-    <ds:schemaRef ds:uri="http://schemas.microsoft.com/internal/obd"/>
+    <ds:schemaRef ds:uri="http://schemas.microsoft.com/sharepoint/v3/contenttype/forms"/>
   </ds:schemaRefs>
 </ds:datastoreItem>
 </file>
</xml_diff>